<commit_message>
made some changes to Bayes slides and fixed some things in Session5 ipynb's
</commit_message>
<xml_diff>
--- a/Session5/Session5_Slides.pptx
+++ b/Session5/Session5_Slides.pptx
@@ -551,6 +551,250 @@
     </a:lvl9pPr>
   </p:notesStyle>
 </p:notesMaster>
+</file>
+
+<file path=ppt/notesSlides/notesSlide1.xml><?xml version="1.0" encoding="utf-8"?>
+<p:notes xmlns:a="http://schemas.openxmlformats.org/drawingml/2006/main" xmlns:r="http://schemas.openxmlformats.org/officeDocument/2006/relationships" xmlns:p="http://schemas.openxmlformats.org/presentationml/2006/main">
+  <p:cSld>
+    <p:spTree>
+      <p:nvGrpSpPr>
+        <p:cNvPr id="1" name=""/>
+        <p:cNvGrpSpPr/>
+        <p:nvPr/>
+      </p:nvGrpSpPr>
+      <p:grpSpPr>
+        <a:xfrm>
+          <a:off x="0" y="0"/>
+          <a:ext cx="0" cy="0"/>
+          <a:chOff x="0" y="0"/>
+          <a:chExt cx="0" cy="0"/>
+        </a:xfrm>
+      </p:grpSpPr>
+      <p:sp>
+        <p:nvSpPr>
+          <p:cNvPr id="2" name="Slide Image Placeholder 1"/>
+          <p:cNvSpPr>
+            <a:spLocks noGrp="1" noRot="1" noChangeAspect="1"/>
+          </p:cNvSpPr>
+          <p:nvPr>
+            <p:ph type="sldImg"/>
+          </p:nvPr>
+        </p:nvSpPr>
+        <p:spPr/>
+      </p:sp>
+      <p:sp>
+        <p:nvSpPr>
+          <p:cNvPr id="3" name="Notes Placeholder 2"/>
+          <p:cNvSpPr>
+            <a:spLocks noGrp="1"/>
+          </p:cNvSpPr>
+          <p:nvPr>
+            <p:ph type="body" idx="1"/>
+          </p:nvPr>
+        </p:nvSpPr>
+        <p:spPr/>
+        <p:txBody>
+          <a:bodyPr/>
+          <a:lstStyle/>
+          <a:p>
+            <a:pPr marL="0" marR="0" lvl="0" indent="0" defTabSz="457200" eaLnBrk="1" fontAlgn="auto" latinLnBrk="0" hangingPunct="1">
+              <a:lnSpc>
+                <a:spcPct val="117999"/>
+              </a:lnSpc>
+              <a:spcBef>
+                <a:spcPts val="0"/>
+              </a:spcBef>
+              <a:spcAft>
+                <a:spcPts val="0"/>
+              </a:spcAft>
+              <a:buClrTx/>
+              <a:buSzTx/>
+              <a:buFontTx/>
+              <a:buNone/>
+              <a:tabLst/>
+              <a:defRPr/>
+            </a:pPr>
+            <a:r>
+              <a:rPr lang="en-US" dirty="0"/>
+              <a:t>P(</a:t>
+            </a:r>
+            <a:r>
+              <a:rPr lang="el-GR" dirty="0"/>
+              <a:t>θ|</a:t>
+            </a:r>
+            <a:r>
+              <a:rPr lang="en-US" dirty="0"/>
+              <a:t>D) is the posterior</a:t>
+            </a:r>
+          </a:p>
+        </p:txBody>
+      </p:sp>
+    </p:spTree>
+    <p:extLst>
+      <p:ext uri="{BB962C8B-B14F-4D97-AF65-F5344CB8AC3E}">
+        <p14:creationId xmlns:p14="http://schemas.microsoft.com/office/powerpoint/2010/main" val="3190331148"/>
+      </p:ext>
+    </p:extLst>
+  </p:cSld>
+  <p:clrMapOvr>
+    <a:masterClrMapping/>
+  </p:clrMapOvr>
+</p:notes>
+</file>
+
+<file path=ppt/notesSlides/notesSlide2.xml><?xml version="1.0" encoding="utf-8"?>
+<p:notes xmlns:a="http://schemas.openxmlformats.org/drawingml/2006/main" xmlns:r="http://schemas.openxmlformats.org/officeDocument/2006/relationships" xmlns:p="http://schemas.openxmlformats.org/presentationml/2006/main">
+  <p:cSld>
+    <p:spTree>
+      <p:nvGrpSpPr>
+        <p:cNvPr id="1" name=""/>
+        <p:cNvGrpSpPr/>
+        <p:nvPr/>
+      </p:nvGrpSpPr>
+      <p:grpSpPr>
+        <a:xfrm>
+          <a:off x="0" y="0"/>
+          <a:ext cx="0" cy="0"/>
+          <a:chOff x="0" y="0"/>
+          <a:chExt cx="0" cy="0"/>
+        </a:xfrm>
+      </p:grpSpPr>
+      <p:sp>
+        <p:nvSpPr>
+          <p:cNvPr id="2" name="Slide Image Placeholder 1"/>
+          <p:cNvSpPr>
+            <a:spLocks noGrp="1" noRot="1" noChangeAspect="1"/>
+          </p:cNvSpPr>
+          <p:nvPr>
+            <p:ph type="sldImg"/>
+          </p:nvPr>
+        </p:nvSpPr>
+        <p:spPr/>
+      </p:sp>
+      <p:sp>
+        <p:nvSpPr>
+          <p:cNvPr id="3" name="Notes Placeholder 2"/>
+          <p:cNvSpPr>
+            <a:spLocks noGrp="1"/>
+          </p:cNvSpPr>
+          <p:nvPr>
+            <p:ph type="body" idx="1"/>
+          </p:nvPr>
+        </p:nvSpPr>
+        <p:spPr/>
+        <p:txBody>
+          <a:bodyPr/>
+          <a:lstStyle/>
+          <a:p>
+            <a:pPr marL="0" marR="0" lvl="0" indent="0" defTabSz="457200" eaLnBrk="1" fontAlgn="auto" latinLnBrk="0" hangingPunct="1">
+              <a:lnSpc>
+                <a:spcPct val="117999"/>
+              </a:lnSpc>
+              <a:spcBef>
+                <a:spcPts val="0"/>
+              </a:spcBef>
+              <a:spcAft>
+                <a:spcPts val="0"/>
+              </a:spcAft>
+              <a:buClrTx/>
+              <a:buSzTx/>
+              <a:buFontTx/>
+              <a:buNone/>
+              <a:tabLst/>
+              <a:defRPr/>
+            </a:pPr>
+            <a:r>
+              <a:rPr lang="en-US" dirty="0"/>
+              <a:t>P(D|</a:t>
+            </a:r>
+            <a:r>
+              <a:rPr lang="el-GR" dirty="0"/>
+              <a:t>θ)</a:t>
+            </a:r>
+            <a:r>
+              <a:rPr lang="en-US" dirty="0"/>
+              <a:t> is the </a:t>
+            </a:r>
+            <a:r>
+              <a:rPr lang="en-US" dirty="0" err="1"/>
+              <a:t>liklihood</a:t>
+            </a:r>
+            <a:endParaRPr lang="el-GR" dirty="0"/>
+          </a:p>
+        </p:txBody>
+      </p:sp>
+    </p:spTree>
+    <p:extLst>
+      <p:ext uri="{BB962C8B-B14F-4D97-AF65-F5344CB8AC3E}">
+        <p14:creationId xmlns:p14="http://schemas.microsoft.com/office/powerpoint/2010/main" val="3167711030"/>
+      </p:ext>
+    </p:extLst>
+  </p:cSld>
+  <p:clrMapOvr>
+    <a:masterClrMapping/>
+  </p:clrMapOvr>
+</p:notes>
+</file>
+
+<file path=ppt/notesSlides/notesSlide3.xml><?xml version="1.0" encoding="utf-8"?>
+<p:notes xmlns:a="http://schemas.openxmlformats.org/drawingml/2006/main" xmlns:r="http://schemas.openxmlformats.org/officeDocument/2006/relationships" xmlns:p="http://schemas.openxmlformats.org/presentationml/2006/main">
+  <p:cSld>
+    <p:spTree>
+      <p:nvGrpSpPr>
+        <p:cNvPr id="1" name=""/>
+        <p:cNvGrpSpPr/>
+        <p:nvPr/>
+      </p:nvGrpSpPr>
+      <p:grpSpPr>
+        <a:xfrm>
+          <a:off x="0" y="0"/>
+          <a:ext cx="0" cy="0"/>
+          <a:chOff x="0" y="0"/>
+          <a:chExt cx="0" cy="0"/>
+        </a:xfrm>
+      </p:grpSpPr>
+      <p:sp>
+        <p:nvSpPr>
+          <p:cNvPr id="2" name="Slide Image Placeholder 1"/>
+          <p:cNvSpPr>
+            <a:spLocks noGrp="1" noRot="1" noChangeAspect="1"/>
+          </p:cNvSpPr>
+          <p:nvPr>
+            <p:ph type="sldImg"/>
+          </p:nvPr>
+        </p:nvSpPr>
+        <p:spPr/>
+      </p:sp>
+      <p:sp>
+        <p:nvSpPr>
+          <p:cNvPr id="3" name="Notes Placeholder 2"/>
+          <p:cNvSpPr>
+            <a:spLocks noGrp="1"/>
+          </p:cNvSpPr>
+          <p:nvPr>
+            <p:ph type="body" idx="1"/>
+          </p:nvPr>
+        </p:nvSpPr>
+        <p:spPr/>
+        <p:txBody>
+          <a:bodyPr/>
+          <a:lstStyle/>
+          <a:p>
+            <a:endParaRPr lang="en-US" dirty="0"/>
+          </a:p>
+        </p:txBody>
+      </p:sp>
+    </p:spTree>
+    <p:extLst>
+      <p:ext uri="{BB962C8B-B14F-4D97-AF65-F5344CB8AC3E}">
+        <p14:creationId xmlns:p14="http://schemas.microsoft.com/office/powerpoint/2010/main" val="2776079662"/>
+      </p:ext>
+    </p:extLst>
+  </p:cSld>
+  <p:clrMapOvr>
+    <a:masterClrMapping/>
+  </p:clrMapOvr>
+</p:notes>
 </file>
 
 <file path=ppt/slideLayouts/slideLayout1.xml><?xml version="1.0" encoding="utf-8"?>
@@ -12867,7 +13111,7 @@
           </a:ln>
           <a:extLst>
             <a:ext uri="{C572A759-6A51-4108-AA02-DFA0A04FC94B}">
-              <ma14:wrappingTextBoxFlag xmlns="" xmlns:ma14="http://schemas.microsoft.com/office/mac/drawingml/2011/main" val="1"/>
+              <ma14:wrappingTextBoxFlag xmlns:ma14="http://schemas.microsoft.com/office/mac/drawingml/2011/main" xmlns="" val="1"/>
             </a:ext>
           </a:extLst>
         </p:spPr>
@@ -12906,7 +13150,7 @@
           </a:ln>
           <a:extLst>
             <a:ext uri="{C572A759-6A51-4108-AA02-DFA0A04FC94B}">
-              <ma14:wrappingTextBoxFlag xmlns="" xmlns:ma14="http://schemas.microsoft.com/office/mac/drawingml/2011/main" val="1"/>
+              <ma14:wrappingTextBoxFlag xmlns:ma14="http://schemas.microsoft.com/office/mac/drawingml/2011/main" xmlns="" val="1"/>
             </a:ext>
           </a:extLst>
         </p:spPr>
@@ -13952,8 +14196,8 @@
         </p:nvSpPr>
         <p:spPr>
           <a:xfrm>
-            <a:off x="3565727" y="2539998"/>
-            <a:ext cx="1392429" cy="1117604"/>
+            <a:off x="3565727" y="2431951"/>
+            <a:ext cx="1354538" cy="1333698"/>
           </a:xfrm>
           <a:prstGeom prst="rect">
             <a:avLst/>
@@ -13966,7 +14210,7 @@
           </a:ln>
           <a:extLst>
             <a:ext uri="{C572A759-6A51-4108-AA02-DFA0A04FC94B}">
-              <ma14:wrappingTextBoxFlag xmlns="" xmlns:ma14="http://schemas.microsoft.com/office/mac/drawingml/2011/main" val="1"/>
+              <ma14:wrappingTextBoxFlag xmlns:ma14="http://schemas.microsoft.com/office/mac/drawingml/2011/main" xmlns="" val="1"/>
             </a:ext>
           </a:extLst>
         </p:spPr>
@@ -13985,7 +14229,16 @@
           </a:lstStyle>
           <a:p>
             <a:r>
-              <a:t>P(A)</a:t>
+              <a:rPr dirty="0"/>
+              <a:t>P(</a:t>
+            </a:r>
+            <a:r>
+              <a:rPr lang="el-GR" dirty="0"/>
+              <a:t>θ</a:t>
+            </a:r>
+            <a:r>
+              <a:rPr dirty="0"/>
+              <a:t>)</a:t>
             </a:r>
           </a:p>
         </p:txBody>
@@ -14054,8 +14307,8 @@
         </p:nvSpPr>
         <p:spPr>
           <a:xfrm>
-            <a:off x="3565727" y="2539998"/>
-            <a:ext cx="1392429" cy="1117604"/>
+            <a:off x="3565727" y="2431951"/>
+            <a:ext cx="1354538" cy="1333698"/>
           </a:xfrm>
           <a:prstGeom prst="rect">
             <a:avLst/>
@@ -14068,7 +14321,7 @@
           </a:ln>
           <a:extLst>
             <a:ext uri="{C572A759-6A51-4108-AA02-DFA0A04FC94B}">
-              <ma14:wrappingTextBoxFlag xmlns="" xmlns:ma14="http://schemas.microsoft.com/office/mac/drawingml/2011/main" val="1"/>
+              <ma14:wrappingTextBoxFlag xmlns:ma14="http://schemas.microsoft.com/office/mac/drawingml/2011/main" xmlns="" val="1"/>
             </a:ext>
           </a:extLst>
         </p:spPr>
@@ -14087,7 +14340,16 @@
           </a:lstStyle>
           <a:p>
             <a:r>
-              <a:t>P(A)</a:t>
+              <a:rPr dirty="0"/>
+              <a:t>P(</a:t>
+            </a:r>
+            <a:r>
+              <a:rPr lang="el-GR" dirty="0"/>
+              <a:t>θ</a:t>
+            </a:r>
+            <a:r>
+              <a:rPr dirty="0"/>
+              <a:t>)</a:t>
             </a:r>
           </a:p>
         </p:txBody>
@@ -14177,8 +14439,8 @@
         </p:nvSpPr>
         <p:spPr>
           <a:xfrm>
-            <a:off x="7095202" y="1191881"/>
-            <a:ext cx="1411733" cy="1117604"/>
+            <a:off x="7095202" y="1083834"/>
+            <a:ext cx="1412246" cy="1333698"/>
           </a:xfrm>
           <a:prstGeom prst="rect">
             <a:avLst/>
@@ -14191,7 +14453,7 @@
           </a:ln>
           <a:extLst>
             <a:ext uri="{C572A759-6A51-4108-AA02-DFA0A04FC94B}">
-              <ma14:wrappingTextBoxFlag xmlns="" xmlns:ma14="http://schemas.microsoft.com/office/mac/drawingml/2011/main" val="1"/>
+              <ma14:wrappingTextBoxFlag xmlns:ma14="http://schemas.microsoft.com/office/mac/drawingml/2011/main" xmlns="" val="1"/>
             </a:ext>
           </a:extLst>
         </p:spPr>
@@ -14213,7 +14475,16 @@
           </a:lstStyle>
           <a:p>
             <a:r>
-              <a:t>P(B)</a:t>
+              <a:rPr dirty="0"/>
+              <a:t>P(</a:t>
+            </a:r>
+            <a:r>
+              <a:rPr lang="en-US" dirty="0"/>
+              <a:t>D</a:t>
+            </a:r>
+            <a:r>
+              <a:rPr dirty="0"/>
+              <a:t>)</a:t>
             </a:r>
           </a:p>
         </p:txBody>
@@ -14325,8 +14596,8 @@
         </p:nvSpPr>
         <p:spPr>
           <a:xfrm>
-            <a:off x="2408756" y="7412704"/>
-            <a:ext cx="2313941" cy="1117604"/>
+            <a:off x="2408756" y="7304657"/>
+            <a:ext cx="2285882" cy="1333698"/>
           </a:xfrm>
           <a:prstGeom prst="rect">
             <a:avLst/>
@@ -14339,7 +14610,7 @@
           </a:ln>
           <a:extLst>
             <a:ext uri="{C572A759-6A51-4108-AA02-DFA0A04FC94B}">
-              <ma14:wrappingTextBoxFlag xmlns:ma14="http://schemas.microsoft.com/office/mac/drawingml/2011/main" xmlns="" val="1"/>
+              <ma14:wrappingTextBoxFlag xmlns="" xmlns:ma14="http://schemas.microsoft.com/office/mac/drawingml/2011/main" val="1"/>
             </a:ext>
           </a:extLst>
         </p:spPr>
@@ -14364,8 +14635,16 @@
               <a:t>P(</a:t>
             </a:r>
             <a:r>
-              <a:rPr dirty="0" err="1"/>
-              <a:t>A&amp;B</a:t>
+              <a:rPr lang="el-GR" dirty="0"/>
+              <a:t>θ</a:t>
+            </a:r>
+            <a:r>
+              <a:rPr dirty="0"/>
+              <a:t>&amp;</a:t>
+            </a:r>
+            <a:r>
+              <a:rPr lang="en-US" dirty="0"/>
+              <a:t>D</a:t>
             </a:r>
             <a:r>
               <a:rPr dirty="0"/>
@@ -14723,7 +15002,7 @@
           </a:ln>
           <a:extLst>
             <a:ext uri="{C572A759-6A51-4108-AA02-DFA0A04FC94B}">
-              <ma14:wrappingTextBoxFlag xmlns="" xmlns:ma14="http://schemas.microsoft.com/office/mac/drawingml/2011/main" val="1"/>
+              <ma14:wrappingTextBoxFlag xmlns:ma14="http://schemas.microsoft.com/office/mac/drawingml/2011/main" xmlns="" val="1"/>
             </a:ext>
           </a:extLst>
         </p:spPr>
@@ -14746,8 +15025,16 @@
               <a:t>P(</a:t>
             </a:r>
             <a:r>
-              <a:rPr dirty="0" err="1"/>
-              <a:t>A|B</a:t>
+              <a:rPr lang="el-GR" dirty="0"/>
+              <a:t>θ</a:t>
+            </a:r>
+            <a:r>
+              <a:rPr dirty="0"/>
+              <a:t>|</a:t>
+            </a:r>
+            <a:r>
+              <a:rPr lang="en-US" dirty="0"/>
+              <a:t>D</a:t>
             </a:r>
             <a:r>
               <a:rPr dirty="0"/>
@@ -14765,8 +15052,8 @@
         </p:nvSpPr>
         <p:spPr>
           <a:xfrm>
-            <a:off x="2241719" y="1253528"/>
-            <a:ext cx="9664325" cy="1117605"/>
+            <a:off x="2241719" y="913009"/>
+            <a:ext cx="9664325" cy="1333698"/>
           </a:xfrm>
           <a:prstGeom prst="rect">
             <a:avLst/>
@@ -14779,7 +15066,7 @@
           </a:ln>
           <a:extLst>
             <a:ext uri="{C572A759-6A51-4108-AA02-DFA0A04FC94B}">
-              <ma14:wrappingTextBoxFlag xmlns="" xmlns:ma14="http://schemas.microsoft.com/office/mac/drawingml/2011/main" val="1"/>
+              <ma14:wrappingTextBoxFlag xmlns:ma14="http://schemas.microsoft.com/office/mac/drawingml/2011/main" xmlns="" val="1"/>
             </a:ext>
           </a:extLst>
         </p:spPr>
@@ -14799,7 +15086,23 @@
           <a:p>
             <a:r>
               <a:rPr dirty="0"/>
-              <a:t>What fraction of B is also A?</a:t>
+              <a:t>What fraction of </a:t>
+            </a:r>
+            <a:r>
+              <a:rPr lang="en-US" dirty="0"/>
+              <a:t>D</a:t>
+            </a:r>
+            <a:r>
+              <a:rPr dirty="0"/>
+              <a:t> is also </a:t>
+            </a:r>
+            <a:r>
+              <a:rPr lang="el-GR" dirty="0"/>
+              <a:t>θ</a:t>
+            </a:r>
+            <a:r>
+              <a:rPr dirty="0"/>
+              <a:t>?</a:t>
             </a:r>
           </a:p>
         </p:txBody>
@@ -14830,7 +15133,7 @@
           </a:ln>
           <a:extLst>
             <a:ext uri="{C572A759-6A51-4108-AA02-DFA0A04FC94B}">
-              <ma14:wrappingTextBoxFlag xmlns:ma14="http://schemas.microsoft.com/office/mac/drawingml/2011/main" xmlns="" val="1"/>
+              <ma14:wrappingTextBoxFlag xmlns="" xmlns:ma14="http://schemas.microsoft.com/office/mac/drawingml/2011/main" val="1"/>
             </a:ext>
           </a:extLst>
         </p:spPr>
@@ -14883,7 +15186,7 @@
               </a:ln>
               <a:extLst>
                 <a:ext uri="{C572A759-6A51-4108-AA02-DFA0A04FC94B}">
-                  <ma14:wrappingTextBoxFlag xmlns:ma14="http://schemas.microsoft.com/office/mac/drawingml/2011/main" xmlns="" val="1"/>
+                  <ma14:wrappingTextBoxFlag xmlns="" xmlns:ma14="http://schemas.microsoft.com/office/mac/drawingml/2011/main" val="1"/>
                 </a:ext>
               </a:extLst>
             </p:spPr>
@@ -14901,6 +15204,7 @@
                 </a:lvl1pPr>
               </a:lstStyle>
               <a:p>
+                <a:pPr/>
                 <a14:m>
                   <m:oMathPara xmlns:m="http://schemas.openxmlformats.org/officeDocument/2006/math">
                     <m:oMathParaPr>
@@ -14935,13 +15239,13 @@
                             <m:t>(</m:t>
                           </m:r>
                           <m:r>
-                            <a:rPr lang="en-US" b="0" i="1" smtClean="0">
+                            <a:rPr lang="el-GR" i="1">
                               <a:solidFill>
                                 <a:schemeClr val="accent6"/>
                               </a:solidFill>
                               <a:latin typeface="Cambria Math" panose="02040503050406030204" pitchFamily="18" charset="0"/>
                             </a:rPr>
-                            <m:t>𝐴</m:t>
+                            <m:t>𝜃</m:t>
                           </m:r>
                           <m:r>
                             <a:rPr lang="en-US" b="0" i="1" smtClean="0">
@@ -15042,9 +15346,9 @@
                 <a:avLst/>
               </a:prstGeom>
               <a:blipFill>
-                <a:blip r:embed="rId2"/>
+                <a:blip r:embed="rId3"/>
                 <a:stretch>
-                  <a:fillRect/>
+                  <a:fillRect l="-4620" t="-472" r="-7921" b="-15094"/>
                 </a:stretch>
               </a:blipFill>
               <a:ln w="12700">
@@ -15052,7 +15356,7 @@
               </a:ln>
               <a:extLst>
                 <a:ext uri="{C572A759-6A51-4108-AA02-DFA0A04FC94B}">
-                  <ma14:wrappingTextBoxFlag xmlns:ma14="http://schemas.microsoft.com/office/mac/drawingml/2011/main" xmlns="" val="1"/>
+                  <ma14:wrappingTextBoxFlag xmlns="" xmlns:ma14="http://schemas.microsoft.com/office/mac/drawingml/2011/main" xmlns:a14="http://schemas.microsoft.com/office/drawing/2010/main" val="1"/>
                 </a:ext>
               </a:extLst>
             </p:spPr>
@@ -15281,7 +15585,7 @@
                 <a:cs typeface="DIN Condensed"/>
                 <a:sym typeface="DIN Condensed"/>
               </a:rPr>
-              <a:t>P(B)</a:t>
+              <a:t>P(D)</a:t>
             </a:r>
           </a:p>
         </p:txBody>
@@ -15371,7 +15675,7 @@
           <p:nvPr/>
         </p:nvPicPr>
         <p:blipFill>
-          <a:blip r:embed="rId2"/>
+          <a:blip r:embed="rId3"/>
           <a:stretch>
             <a:fillRect/>
           </a:stretch>
@@ -15499,8 +15803,8 @@
         </p:nvSpPr>
         <p:spPr>
           <a:xfrm>
-            <a:off x="2241719" y="529928"/>
-            <a:ext cx="9664325" cy="2564805"/>
+            <a:off x="2241719" y="1145481"/>
+            <a:ext cx="9664325" cy="1333698"/>
           </a:xfrm>
           <a:prstGeom prst="rect">
             <a:avLst/>
@@ -15511,7 +15815,7 @@
           </a:ln>
           <a:extLst>
             <a:ext uri="{C572A759-6A51-4108-AA02-DFA0A04FC94B}">
-              <ma14:wrappingTextBoxFlag xmlns:ma14="http://schemas.microsoft.com/office/mac/drawingml/2011/main" xmlns="" val="1"/>
+              <ma14:wrappingTextBoxFlag xmlns="" xmlns:ma14="http://schemas.microsoft.com/office/mac/drawingml/2011/main" val="1"/>
             </a:ext>
           </a:extLst>
         </p:spPr>
@@ -15534,12 +15838,20 @@
               <a:t>What fraction of </a:t>
             </a:r>
             <a:r>
+              <a:rPr lang="el-GR" dirty="0"/>
+              <a:t>θ</a:t>
+            </a:r>
+            <a:r>
+              <a:rPr dirty="0"/>
+              <a:t> is also </a:t>
+            </a:r>
+            <a:r>
               <a:rPr lang="en-US" dirty="0"/>
-              <a:t>A</a:t>
+              <a:t>D</a:t>
             </a:r>
             <a:r>
               <a:rPr dirty="0"/>
-              <a:t> is also ?</a:t>
+              <a:t>?</a:t>
             </a:r>
           </a:p>
         </p:txBody>
@@ -15570,7 +15882,7 @@
           </a:ln>
           <a:extLst>
             <a:ext uri="{C572A759-6A51-4108-AA02-DFA0A04FC94B}">
-              <ma14:wrappingTextBoxFlag xmlns:ma14="http://schemas.microsoft.com/office/mac/drawingml/2011/main" xmlns="" val="1"/>
+              <ma14:wrappingTextBoxFlag xmlns="" xmlns:ma14="http://schemas.microsoft.com/office/mac/drawingml/2011/main" val="1"/>
             </a:ext>
           </a:extLst>
         </p:spPr>
@@ -15593,16 +15905,16 @@
               <a:t>P(</a:t>
             </a:r>
             <a:r>
-              <a:rPr lang="en-US" dirty="0" err="1"/>
-              <a:t>B</a:t>
-            </a:r>
-            <a:r>
-              <a:rPr dirty="0" err="1"/>
+              <a:rPr lang="en-US" dirty="0"/>
+              <a:t>D</a:t>
+            </a:r>
+            <a:r>
+              <a:rPr dirty="0"/>
               <a:t>|</a:t>
             </a:r>
             <a:r>
-              <a:rPr lang="en-US" dirty="0" err="1"/>
-              <a:t>A</a:t>
+              <a:rPr lang="el-GR" dirty="0"/>
+              <a:t>θ</a:t>
             </a:r>
             <a:r>
               <a:rPr dirty="0"/>
@@ -15638,7 +15950,7 @@
           </a:ln>
           <a:extLst>
             <a:ext uri="{C572A759-6A51-4108-AA02-DFA0A04FC94B}">
-              <ma14:wrappingTextBoxFlag xmlns="" xmlns:ma14="http://schemas.microsoft.com/office/mac/drawingml/2011/main" val="1"/>
+              <ma14:wrappingTextBoxFlag xmlns:ma14="http://schemas.microsoft.com/office/mac/drawingml/2011/main" xmlns="" val="1"/>
             </a:ext>
           </a:extLst>
         </p:spPr>
@@ -15691,7 +16003,7 @@
               </a:ln>
               <a:extLst>
                 <a:ext uri="{C572A759-6A51-4108-AA02-DFA0A04FC94B}">
-                  <ma14:wrappingTextBoxFlag xmlns="" xmlns:ma14="http://schemas.microsoft.com/office/mac/drawingml/2011/main" val="1"/>
+                  <ma14:wrappingTextBoxFlag xmlns:ma14="http://schemas.microsoft.com/office/mac/drawingml/2011/main" xmlns="" val="1"/>
                 </a:ext>
               </a:extLst>
             </p:spPr>
@@ -15744,13 +16056,13 @@
                             <m:t>(</m:t>
                           </m:r>
                           <m:r>
-                            <a:rPr lang="en-US" b="0" i="1" smtClean="0">
+                            <a:rPr lang="el-GR" i="1">
                               <a:solidFill>
                                 <a:schemeClr val="accent6"/>
                               </a:solidFill>
                               <a:latin typeface="Cambria Math" panose="02040503050406030204" pitchFamily="18" charset="0"/>
                             </a:rPr>
-                            <m:t>𝐴</m:t>
+                            <m:t>𝜃</m:t>
                           </m:r>
                           <m:r>
                             <a:rPr lang="en-US" b="0" i="1" smtClean="0">
@@ -15768,7 +16080,7 @@
                               </a:solidFill>
                               <a:latin typeface="Cambria Math" panose="02040503050406030204" pitchFamily="18" charset="0"/>
                             </a:rPr>
-                            <m:t>𝐵</m:t>
+                            <m:t>𝐷</m:t>
                           </m:r>
                           <m:r>
                             <a:rPr lang="en-US" b="0" i="1" smtClean="0">
@@ -15800,13 +16112,13 @@
                             <m:t>(</m:t>
                           </m:r>
                           <m:r>
-                            <a:rPr lang="en-US" b="0" i="1" smtClean="0">
+                            <a:rPr lang="el-GR" i="1">
                               <a:solidFill>
                                 <a:srgbClr val="FF0000"/>
                               </a:solidFill>
                               <a:latin typeface="Cambria Math" panose="02040503050406030204" pitchFamily="18" charset="0"/>
                             </a:rPr>
-                            <m:t>𝐴</m:t>
+                            <m:t>𝜃</m:t>
                           </m:r>
                           <m:r>
                             <a:rPr lang="en-US" b="0" i="1" smtClean="0">
@@ -15851,9 +16163,9 @@
                 <a:avLst/>
               </a:prstGeom>
               <a:blipFill>
-                <a:blip r:embed="rId3"/>
+                <a:blip r:embed="rId4"/>
                 <a:stretch>
-                  <a:fillRect/>
+                  <a:fillRect l="-5298" t="-1429" r="-8609" b="-15714"/>
                 </a:stretch>
               </a:blipFill>
               <a:ln w="12700">
@@ -15861,7 +16173,7 @@
               </a:ln>
               <a:extLst>
                 <a:ext uri="{C572A759-6A51-4108-AA02-DFA0A04FC94B}">
-                  <ma14:wrappingTextBoxFlag xmlns="" xmlns:ma14="http://schemas.microsoft.com/office/mac/drawingml/2011/main" val="1"/>
+                  <ma14:wrappingTextBoxFlag xmlns:ma14="http://schemas.microsoft.com/office/mac/drawingml/2011/main" xmlns="" xmlns:a14="http://schemas.microsoft.com/office/drawing/2010/main" val="1"/>
                 </a:ext>
               </a:extLst>
             </p:spPr>
@@ -16008,7 +16320,41 @@
                 <a:cs typeface="DIN Condensed"/>
                 <a:sym typeface="DIN Condensed"/>
               </a:rPr>
-              <a:t>P(A)</a:t>
+              <a:t>P(</a:t>
+            </a:r>
+            <a:r>
+              <a:rPr kumimoji="0" lang="el-GR" sz="4000" b="0" i="0" u="none" strike="noStrike" cap="none" spc="0" normalizeH="0" baseline="0" dirty="0">
+                <a:ln>
+                  <a:noFill/>
+                </a:ln>
+                <a:solidFill>
+                  <a:srgbClr val="FF0000"/>
+                </a:solidFill>
+                <a:effectLst/>
+                <a:uFillTx/>
+                <a:latin typeface="+mn-lt"/>
+                <a:ea typeface="DIN Condensed"/>
+                <a:cs typeface="DIN Condensed"/>
+                <a:sym typeface="DIN Condensed"/>
+              </a:rPr>
+              <a:t>θ</a:t>
+            </a:r>
+            <a:r>
+              <a:rPr kumimoji="0" lang="en-US" sz="4000" b="0" i="0" u="none" strike="noStrike" cap="none" spc="0" normalizeH="0" baseline="0" dirty="0">
+                <a:ln>
+                  <a:noFill/>
+                </a:ln>
+                <a:solidFill>
+                  <a:srgbClr val="FF0000"/>
+                </a:solidFill>
+                <a:effectLst/>
+                <a:uFillTx/>
+                <a:latin typeface="+mn-lt"/>
+                <a:ea typeface="DIN Condensed"/>
+                <a:cs typeface="DIN Condensed"/>
+                <a:sym typeface="DIN Condensed"/>
+              </a:rPr>
+              <a:t>)</a:t>
             </a:r>
           </a:p>
         </p:txBody>
@@ -16087,21 +16433,10 @@
               </a:bodyPr>
               <a:lstStyle/>
               <a:p>
-                <a:pPr marL="0" marR="0" indent="0" algn="l" defTabSz="584200" rtl="0" fontAlgn="auto" latinLnBrk="0" hangingPunct="0">
-                  <a:lnSpc>
-                    <a:spcPct val="100000"/>
-                  </a:lnSpc>
+                <a:pPr>
                   <a:spcBef>
                     <a:spcPts val="0"/>
                   </a:spcBef>
-                  <a:spcAft>
-                    <a:spcPts val="0"/>
-                  </a:spcAft>
-                  <a:buClrTx/>
-                  <a:buSzTx/>
-                  <a:buFontTx/>
-                  <a:buNone/>
-                  <a:tabLst/>
                 </a:pPr>
                 <a14:m>
                   <m:oMathPara xmlns:m="http://schemas.openxmlformats.org/officeDocument/2006/math">
@@ -16143,19 +16478,13 @@
                         </m:dPr>
                         <m:e>
                           <m:r>
-                            <a:rPr kumimoji="0" lang="en-US" sz="7000" b="0" i="1" u="none" strike="noStrike" cap="none" spc="0" normalizeH="0" baseline="0" smtClean="0">
-                              <a:ln>
-                                <a:noFill/>
-                              </a:ln>
+                            <a:rPr lang="el-GR" sz="7000" i="1">
                               <a:solidFill>
                                 <a:schemeClr val="accent3"/>
                               </a:solidFill>
-                              <a:effectLst/>
-                              <a:uFillTx/>
                               <a:latin typeface="Cambria Math" panose="02040503050406030204" pitchFamily="18" charset="0"/>
-                              <a:sym typeface="DIN Condensed"/>
                             </a:rPr>
-                            <m:t>𝐴</m:t>
+                            <m:t>𝜃</m:t>
                           </m:r>
                         </m:e>
                         <m:e>
@@ -16172,7 +16501,7 @@
                               <a:latin typeface="Cambria Math" panose="02040503050406030204" pitchFamily="18" charset="0"/>
                               <a:sym typeface="DIN Condensed"/>
                             </a:rPr>
-                            <m:t>𝐵</m:t>
+                            <m:t>𝐷</m:t>
                           </m:r>
                         </m:e>
                       </m:d>
@@ -16255,24 +16584,18 @@
                                   <a:latin typeface="Cambria Math" panose="02040503050406030204" pitchFamily="18" charset="0"/>
                                   <a:sym typeface="DIN Condensed"/>
                                 </a:rPr>
-                                <m:t>𝐵</m:t>
+                                <m:t>𝐷</m:t>
                               </m:r>
                             </m:e>
                             <m:e>
                               <m:r>
-                                <a:rPr kumimoji="0" lang="en-US" sz="7000" b="0" i="1" u="none" strike="noStrike" cap="none" spc="0" normalizeH="0" baseline="0" smtClean="0">
-                                  <a:ln>
-                                    <a:noFill/>
-                                  </a:ln>
+                                <a:rPr lang="el-GR" sz="7000" i="1">
                                   <a:solidFill>
                                     <a:schemeClr val="tx2"/>
                                   </a:solidFill>
-                                  <a:effectLst/>
-                                  <a:uFillTx/>
                                   <a:latin typeface="Cambria Math" panose="02040503050406030204" pitchFamily="18" charset="0"/>
-                                  <a:sym typeface="DIN Condensed"/>
                                 </a:rPr>
-                                <m:t>𝐴</m:t>
+                                <m:t>𝜃</m:t>
                               </m:r>
                             </m:e>
                           </m:d>
@@ -16307,19 +16630,13 @@
                             <m:t>(</m:t>
                           </m:r>
                           <m:r>
-                            <a:rPr kumimoji="0" lang="en-US" sz="7000" b="0" i="1" u="none" strike="noStrike" cap="none" spc="0" normalizeH="0" baseline="0" smtClean="0">
-                              <a:ln>
-                                <a:noFill/>
-                              </a:ln>
+                            <a:rPr lang="el-GR" sz="7000" i="1">
                               <a:solidFill>
                                 <a:srgbClr val="FF0000"/>
                               </a:solidFill>
-                              <a:effectLst/>
-                              <a:uFillTx/>
                               <a:latin typeface="Cambria Math" panose="02040503050406030204" pitchFamily="18" charset="0"/>
-                              <a:sym typeface="DIN Condensed"/>
                             </a:rPr>
-                            <m:t>𝐴</m:t>
+                            <m:t>𝜃</m:t>
                           </m:r>
                           <m:r>
                             <a:rPr kumimoji="0" lang="en-US" sz="7000" b="0" i="1" u="none" strike="noStrike" cap="none" spc="0" normalizeH="0" baseline="0" smtClean="0">
@@ -16381,7 +16698,7 @@
                               <a:latin typeface="Cambria Math" panose="02040503050406030204" pitchFamily="18" charset="0"/>
                               <a:sym typeface="DIN Condensed"/>
                             </a:rPr>
-                            <m:t>𝐵</m:t>
+                            <m:t>𝐷</m:t>
                           </m:r>
                           <m:r>
                             <a:rPr kumimoji="0" lang="en-US" sz="7000" b="0" i="1" u="none" strike="noStrike" cap="none" spc="0" normalizeH="0" baseline="0" smtClean="0">
@@ -16445,7 +16762,7 @@
               <a:blipFill>
                 <a:blip r:embed="rId2"/>
                 <a:stretch>
-                  <a:fillRect/>
+                  <a:fillRect r="-1440"/>
                 </a:stretch>
               </a:blipFill>
               <a:ln w="12700" cap="flat">
@@ -16478,7 +16795,7 @@
         <p:spPr>
           <a:xfrm>
             <a:off x="469907" y="1753444"/>
-            <a:ext cx="7950895" cy="1179810"/>
+            <a:ext cx="6056145" cy="1179810"/>
           </a:xfrm>
           <a:prstGeom prst="rect">
             <a:avLst/>
@@ -16491,7 +16808,7 @@
           </a:ln>
           <a:extLst>
             <a:ext uri="{C572A759-6A51-4108-AA02-DFA0A04FC94B}">
-              <ma14:wrappingTextBoxFlag xmlns="" xmlns:ma14="http://schemas.microsoft.com/office/mac/drawingml/2011/main" val="1"/>
+              <ma14:wrappingTextBoxFlag xmlns:ma14="http://schemas.microsoft.com/office/mac/drawingml/2011/main" xmlns="" val="1"/>
             </a:ext>
           </a:extLst>
         </p:spPr>
@@ -16515,15 +16832,55 @@
                   <a:schemeClr val="accent6"/>
                 </a:solidFill>
               </a:rPr>
-              <a:t>P(A &amp; B) </a:t>
+              <a:t>P(</a:t>
+            </a:r>
+            <a:r>
+              <a:rPr lang="el-GR" sz="7000" dirty="0">
+                <a:solidFill>
+                  <a:schemeClr val="accent6"/>
+                </a:solidFill>
+              </a:rPr>
+              <a:t>θ</a:t>
+            </a:r>
+            <a:r>
+              <a:rPr sz="7000" dirty="0">
+                <a:solidFill>
+                  <a:schemeClr val="accent6"/>
+                </a:solidFill>
+              </a:rPr>
+              <a:t> &amp; </a:t>
+            </a:r>
+            <a:r>
+              <a:rPr lang="en-US" sz="7000" dirty="0">
+                <a:solidFill>
+                  <a:schemeClr val="accent6"/>
+                </a:solidFill>
+              </a:rPr>
+              <a:t>D</a:t>
+            </a:r>
+            <a:r>
+              <a:rPr sz="7000" dirty="0">
+                <a:solidFill>
+                  <a:schemeClr val="accent6"/>
+                </a:solidFill>
+              </a:rPr>
+              <a:t>) </a:t>
             </a:r>
             <a:r>
               <a:rPr sz="7000" dirty="0"/>
               <a:t>= P(</a:t>
             </a:r>
             <a:r>
-              <a:rPr sz="7000" dirty="0" err="1"/>
-              <a:t>B|A</a:t>
+              <a:rPr lang="en-US" sz="7000" dirty="0"/>
+              <a:t>D</a:t>
+            </a:r>
+            <a:r>
+              <a:rPr sz="7000" dirty="0"/>
+              <a:t>|</a:t>
+            </a:r>
+            <a:r>
+              <a:rPr lang="el-GR" sz="7000" dirty="0"/>
+              <a:t>θ</a:t>
             </a:r>
             <a:r>
               <a:rPr sz="7000" dirty="0"/>
@@ -16535,7 +16892,23 @@
                   <a:srgbClr val="FF0000"/>
                 </a:solidFill>
               </a:rPr>
-              <a:t>P(A)</a:t>
+              <a:t>P(</a:t>
+            </a:r>
+            <a:r>
+              <a:rPr lang="el-GR" sz="7000" dirty="0">
+                <a:solidFill>
+                  <a:srgbClr val="FF0000"/>
+                </a:solidFill>
+              </a:rPr>
+              <a:t>θ</a:t>
+            </a:r>
+            <a:r>
+              <a:rPr sz="7000" dirty="0">
+                <a:solidFill>
+                  <a:srgbClr val="FF0000"/>
+                </a:solidFill>
+              </a:rPr>
+              <a:t>)</a:t>
             </a:r>
           </a:p>
         </p:txBody>
@@ -16648,7 +17021,7 @@
         <p:spPr>
           <a:xfrm>
             <a:off x="469907" y="7649947"/>
-            <a:ext cx="7920438" cy="1179810"/>
+            <a:ext cx="6073779" cy="1179810"/>
           </a:xfrm>
           <a:prstGeom prst="rect">
             <a:avLst/>
@@ -16661,7 +17034,7 @@
           </a:ln>
           <a:extLst>
             <a:ext uri="{C572A759-6A51-4108-AA02-DFA0A04FC94B}">
-              <ma14:wrappingTextBoxFlag xmlns:ma14="http://schemas.microsoft.com/office/mac/drawingml/2011/main" xmlns="" val="1"/>
+              <ma14:wrappingTextBoxFlag xmlns="" xmlns:ma14="http://schemas.microsoft.com/office/mac/drawingml/2011/main" val="1"/>
             </a:ext>
           </a:extLst>
         </p:spPr>
@@ -16685,23 +17058,55 @@
                   <a:schemeClr val="accent6"/>
                 </a:solidFill>
               </a:rPr>
-              <a:t>P(A &amp; B) </a:t>
+              <a:t>P(</a:t>
+            </a:r>
+            <a:r>
+              <a:rPr lang="el-GR" sz="7000" dirty="0">
+                <a:solidFill>
+                  <a:schemeClr val="accent6"/>
+                </a:solidFill>
+              </a:rPr>
+              <a:t>θ</a:t>
+            </a:r>
+            <a:r>
+              <a:rPr sz="7000" dirty="0">
+                <a:solidFill>
+                  <a:schemeClr val="accent6"/>
+                </a:solidFill>
+              </a:rPr>
+              <a:t> &amp; </a:t>
+            </a:r>
+            <a:r>
+              <a:rPr lang="en-US" sz="7000" dirty="0">
+                <a:solidFill>
+                  <a:schemeClr val="accent6"/>
+                </a:solidFill>
+              </a:rPr>
+              <a:t>D</a:t>
+            </a:r>
+            <a:r>
+              <a:rPr sz="7000" dirty="0">
+                <a:solidFill>
+                  <a:schemeClr val="accent6"/>
+                </a:solidFill>
+              </a:rPr>
+              <a:t>) </a:t>
             </a:r>
             <a:r>
               <a:rPr sz="7000" dirty="0"/>
               <a:t>= P(</a:t>
             </a:r>
             <a:r>
-              <a:rPr lang="en-US" sz="7000" dirty="0" err="1"/>
-              <a:t>A</a:t>
-            </a:r>
-            <a:r>
-              <a:rPr sz="7000" dirty="0" err="1"/>
+              <a:rPr lang="el-GR" sz="7000" dirty="0"/>
+              <a:t>θ</a:t>
+            </a:r>
+            <a:r>
+              <a:rPr sz="7000" dirty="0"/>
               <a:t>|</a:t>
             </a:r>
             <a:r>
-              <a:rPr lang="en-US" sz="7000" dirty="0" err="1"/>
-              <a:t>B</a:t>
+              <a:rPr lang="en-US" sz="7000" dirty="0"/>
+              <a:t>D</a:t>
             </a:r>
             <a:r>
               <a:rPr sz="7000" dirty="0"/>
@@ -16721,7 +17126,7 @@
                   <a:schemeClr val="accent1"/>
                 </a:solidFill>
               </a:rPr>
-              <a:t>B</a:t>
+              <a:t>D</a:t>
             </a:r>
             <a:r>
               <a:rPr sz="7000" dirty="0">
@@ -17090,7 +17495,7 @@
           <p:nvPr/>
         </p:nvPicPr>
         <p:blipFill>
-          <a:blip r:embed="rId2"/>
+          <a:blip r:embed="rId3"/>
           <a:stretch>
             <a:fillRect/>
           </a:stretch>
@@ -17153,7 +17558,7 @@
           </a:ln>
           <a:extLst>
             <a:ext uri="{C572A759-6A51-4108-AA02-DFA0A04FC94B}">
-              <ma14:wrappingTextBoxFlag xmlns="" xmlns:ma14="http://schemas.microsoft.com/office/mac/drawingml/2011/main" val="1"/>
+              <ma14:wrappingTextBoxFlag xmlns:ma14="http://schemas.microsoft.com/office/mac/drawingml/2011/main" xmlns="" val="1"/>
             </a:ext>
           </a:extLst>
         </p:spPr>
@@ -17179,12 +17584,28 @@
               </a:defRPr>
             </a:pPr>
             <a:r>
-              <a:rPr>
+              <a:rPr dirty="0">
                 <a:solidFill>
                   <a:srgbClr val="A7A7A7"/>
                 </a:solidFill>
               </a:rPr>
-              <a:t>P(BC|+test) = P(+test|BC)P(BC) / P(+test)</a:t>
+              <a:t>P(BC|+test) = P(+</a:t>
+            </a:r>
+            <a:r>
+              <a:rPr dirty="0" err="1">
+                <a:solidFill>
+                  <a:srgbClr val="A7A7A7"/>
+                </a:solidFill>
+              </a:rPr>
+              <a:t>test|BC</a:t>
+            </a:r>
+            <a:r>
+              <a:rPr dirty="0">
+                <a:solidFill>
+                  <a:srgbClr val="A7A7A7"/>
+                </a:solidFill>
+              </a:rPr>
+              <a:t>)P(BC) / P(+test)</a:t>
             </a:r>
           </a:p>
         </p:txBody>
@@ -17424,6 +17845,7 @@
           </a:lstStyle>
           <a:p>
             <a:r>
+              <a:rPr dirty="0"/>
               <a:t>Bayes Theorem</a:t>
             </a:r>
           </a:p>
@@ -17684,6 +18106,7 @@
           </a:lstStyle>
           <a:p>
             <a:r>
+              <a:rPr dirty="0"/>
               <a:t>Detecting Spam</a:t>
             </a:r>
           </a:p>
@@ -17882,7 +18305,7 @@
           </a:ln>
           <a:extLst>
             <a:ext uri="{C572A759-6A51-4108-AA02-DFA0A04FC94B}">
-              <ma14:wrappingTextBoxFlag xmlns="" xmlns:ma14="http://schemas.microsoft.com/office/mac/drawingml/2011/main" val="1"/>
+              <ma14:wrappingTextBoxFlag xmlns:ma14="http://schemas.microsoft.com/office/mac/drawingml/2011/main" xmlns="" val="1"/>
             </a:ext>
           </a:extLst>
         </p:spPr>
@@ -18027,7 +18450,7 @@
           </a:ln>
           <a:extLst>
             <a:ext uri="{C572A759-6A51-4108-AA02-DFA0A04FC94B}">
-              <ma14:wrappingTextBoxFlag xmlns="" xmlns:ma14="http://schemas.microsoft.com/office/mac/drawingml/2011/main" val="1"/>
+              <ma14:wrappingTextBoxFlag xmlns:ma14="http://schemas.microsoft.com/office/mac/drawingml/2011/main" xmlns="" val="1"/>
             </a:ext>
           </a:extLst>
         </p:spPr>
@@ -18244,7 +18667,7 @@
           </a:ln>
           <a:extLst>
             <a:ext uri="{C572A759-6A51-4108-AA02-DFA0A04FC94B}">
-              <ma14:wrappingTextBoxFlag xmlns="" xmlns:ma14="http://schemas.microsoft.com/office/mac/drawingml/2011/main" val="1"/>
+              <ma14:wrappingTextBoxFlag xmlns:ma14="http://schemas.microsoft.com/office/mac/drawingml/2011/main" xmlns="" val="1"/>
             </a:ext>
           </a:extLst>
         </p:spPr>
@@ -18466,7 +18889,7 @@
         </p:spPr>
         <p:txBody>
           <a:bodyPr>
-            <a:normAutofit fontScale="90000"/>
+            <a:normAutofit/>
           </a:bodyPr>
           <a:lstStyle>
             <a:lvl1pPr>
@@ -18789,7 +19212,7 @@
         </p:spPr>
         <p:txBody>
           <a:bodyPr>
-            <a:normAutofit fontScale="90000"/>
+            <a:normAutofit/>
           </a:bodyPr>
           <a:lstStyle>
             <a:lvl1pPr>
@@ -18973,7 +19396,7 @@
           </a:ln>
           <a:extLst>
             <a:ext uri="{C572A759-6A51-4108-AA02-DFA0A04FC94B}">
-              <ma14:wrappingTextBoxFlag xmlns="" xmlns:ma14="http://schemas.microsoft.com/office/mac/drawingml/2011/main" val="1"/>
+              <ma14:wrappingTextBoxFlag xmlns:ma14="http://schemas.microsoft.com/office/mac/drawingml/2011/main" xmlns="" val="1"/>
             </a:ext>
           </a:extLst>
         </p:spPr>
@@ -19149,7 +19572,7 @@
           </a:ln>
           <a:extLst>
             <a:ext uri="{C572A759-6A51-4108-AA02-DFA0A04FC94B}">
-              <ma14:wrappingTextBoxFlag xmlns="" xmlns:ma14="http://schemas.microsoft.com/office/mac/drawingml/2011/main" val="1"/>
+              <ma14:wrappingTextBoxFlag xmlns:ma14="http://schemas.microsoft.com/office/mac/drawingml/2011/main" xmlns="" val="1"/>
             </a:ext>
           </a:extLst>
         </p:spPr>
@@ -19247,8 +19670,8 @@
           </a:p>
         </p:txBody>
       </p:sp>
-      <mc:AlternateContent xmlns:mc="http://schemas.openxmlformats.org/markup-compatibility/2006">
-        <mc:Choice xmlns:a14="http://schemas.microsoft.com/office/drawing/2010/main" Requires="a14">
+      <mc:AlternateContent xmlns:mc="http://schemas.openxmlformats.org/markup-compatibility/2006" xmlns:a14="http://schemas.microsoft.com/office/drawing/2010/main">
+        <mc:Choice Requires="a14">
           <p:sp>
             <p:nvSpPr>
               <p:cNvPr id="7" name="Text Placeholder 6">
@@ -19294,7 +19717,7 @@
                         <m:dPr>
                           <m:endChr m:val="|"/>
                           <m:ctrlPr>
-                            <a:rPr lang="en-US" sz="3700" b="0" smtClean="0">
+                            <a:rPr lang="en-US" sz="3700" b="0" i="1" smtClean="0">
                               <a:solidFill>
                                 <a:srgbClr val="A7A7A7"/>
                               </a:solidFill>
@@ -19528,7 +19951,7 @@
             </p:txBody>
           </p:sp>
         </mc:Choice>
-        <mc:Fallback>
+        <mc:Fallback xmlns="">
           <p:sp>
             <p:nvSpPr>
               <p:cNvPr id="7" name="Text Placeholder 6">
@@ -19886,7 +20309,7 @@
         </p:style>
         <p:txBody>
           <a:bodyPr rot="0" spcFirstLastPara="1" vertOverflow="overflow" horzOverflow="overflow" vert="horz" wrap="square" lIns="50800" tIns="0" rIns="50800" bIns="0" numCol="1" spcCol="38100" rtlCol="0" anchor="ctr">
-            <a:normAutofit fontScale="85000" lnSpcReduction="10000"/>
+            <a:normAutofit/>
           </a:bodyPr>
           <a:lstStyle/>
           <a:p>
@@ -20510,6 +20933,7 @@
           </a:lstStyle>
           <a:p>
             <a:r>
+              <a:rPr dirty="0"/>
               <a:t>Bayes’ Theorem</a:t>
             </a:r>
           </a:p>
@@ -20562,6 +20986,7 @@
           </a:lstStyle>
           <a:p>
             <a:r>
+              <a:rPr dirty="0"/>
               <a:t>How to evaluate evidence using probability theory</a:t>
             </a:r>
           </a:p>
@@ -20669,6 +21094,7 @@
           </a:lstStyle>
           <a:p>
             <a:r>
+              <a:rPr dirty="0"/>
               <a:t>Probability</a:t>
             </a:r>
           </a:p>
@@ -20799,7 +21225,7 @@
         </p:spPr>
         <p:txBody>
           <a:bodyPr>
-            <a:normAutofit fontScale="90000"/>
+            <a:normAutofit/>
           </a:bodyPr>
           <a:lstStyle>
             <a:lvl1pPr defTabSz="385572">
@@ -20808,6 +21234,7 @@
           </a:lstStyle>
           <a:p>
             <a:r>
+              <a:rPr dirty="0"/>
               <a:t>Conditional Probability</a:t>
             </a:r>
           </a:p>
@@ -20860,7 +21287,24 @@
           </a:lstStyle>
           <a:p>
             <a:r>
-              <a:t>P(A|B) = % of cases where A is true, assuming B is true</a:t>
+              <a:rPr dirty="0"/>
+              <a:t>P(A|</a:t>
+            </a:r>
+            <a:r>
+              <a:rPr lang="en-US" dirty="0"/>
+              <a:t>D</a:t>
+            </a:r>
+            <a:r>
+              <a:rPr dirty="0"/>
+              <a:t>) = % of cases where A is true, assuming </a:t>
+            </a:r>
+            <a:r>
+              <a:rPr lang="en-US" dirty="0"/>
+              <a:t>D</a:t>
+            </a:r>
+            <a:r>
+              <a:rPr dirty="0"/>
+              <a:t> is true</a:t>
             </a:r>
           </a:p>
         </p:txBody>
@@ -20970,6 +21414,7 @@
               </a:defRPr>
             </a:pPr>
             <a:r>
+              <a:rPr dirty="0"/>
               <a:t>I learn: 40% of plane crashes happen during bad weather</a:t>
             </a:r>
           </a:p>
@@ -20997,10 +21442,11 @@
               </a:defRPr>
             </a:pPr>
             <a:r>
+              <a:rPr dirty="0"/>
               <a:t>If there’s bad weather, </a:t>
             </a:r>
             <a:r>
-              <a:rPr>
+              <a:rPr dirty="0">
                 <a:solidFill>
                   <a:schemeClr val="accent5"/>
                 </a:solidFill>
@@ -21116,7 +21562,15 @@
             </a:pPr>
             <a:r>
               <a:rPr dirty="0"/>
-              <a:t>P(A) = airplane crash = 0.</a:t>
+              <a:t>P(</a:t>
+            </a:r>
+            <a:r>
+              <a:rPr lang="el-GR" dirty="0"/>
+              <a:t>θ</a:t>
+            </a:r>
+            <a:r>
+              <a:rPr dirty="0"/>
+              <a:t>) = airplane crash = 0.</a:t>
             </a:r>
             <a:r>
               <a:rPr lang="en-US" dirty="0"/>
@@ -21152,7 +21606,15 @@
             </a:pPr>
             <a:r>
               <a:rPr dirty="0"/>
-              <a:t>P(B) = bad weather = 0.</a:t>
+              <a:t>P(</a:t>
+            </a:r>
+            <a:r>
+              <a:rPr lang="en-US" dirty="0"/>
+              <a:t>D</a:t>
+            </a:r>
+            <a:r>
+              <a:rPr dirty="0"/>
+              <a:t>) = bad weather = 0.</a:t>
             </a:r>
             <a:r>
               <a:rPr lang="en-US" dirty="0"/>
@@ -21188,8 +21650,16 @@
               <a:t>P(</a:t>
             </a:r>
             <a:r>
-              <a:rPr dirty="0" err="1"/>
-              <a:t>B|A</a:t>
+              <a:rPr lang="en-US" dirty="0"/>
+              <a:t>D</a:t>
+            </a:r>
+            <a:r>
+              <a:rPr dirty="0"/>
+              <a:t>|</a:t>
+            </a:r>
+            <a:r>
+              <a:rPr lang="el-GR" dirty="0"/>
+              <a:t>θ</a:t>
             </a:r>
             <a:r>
               <a:rPr dirty="0"/>
@@ -21254,6 +21724,7 @@
           </a:lstStyle>
           <a:p>
             <a:r>
+              <a:rPr dirty="0"/>
               <a:t>Bayes’ Theorem</a:t>
             </a:r>
           </a:p>
@@ -21306,7 +21777,40 @@
           </a:lstStyle>
           <a:p>
             <a:r>
-              <a:t>How to find P(A|B) given P(B|A)</a:t>
+              <a:rPr dirty="0"/>
+              <a:t>How to find P(</a:t>
+            </a:r>
+            <a:r>
+              <a:rPr lang="el-GR" dirty="0"/>
+              <a:t>θ</a:t>
+            </a:r>
+            <a:r>
+              <a:rPr dirty="0"/>
+              <a:t>|</a:t>
+            </a:r>
+            <a:r>
+              <a:rPr lang="en-US" dirty="0"/>
+              <a:t>D</a:t>
+            </a:r>
+            <a:r>
+              <a:rPr dirty="0"/>
+              <a:t>) given P(</a:t>
+            </a:r>
+            <a:r>
+              <a:rPr lang="en-US" dirty="0"/>
+              <a:t>D</a:t>
+            </a:r>
+            <a:r>
+              <a:rPr dirty="0"/>
+              <a:t>|</a:t>
+            </a:r>
+            <a:r>
+              <a:rPr lang="el-GR" dirty="0"/>
+              <a:t>θ</a:t>
+            </a:r>
+            <a:r>
+              <a:rPr dirty="0"/>
+              <a:t>)</a:t>
             </a:r>
           </a:p>
         </p:txBody>

</xml_diff>

<commit_message>
fixed a B to D
</commit_message>
<xml_diff>
--- a/Session5/Session5_Slides.pptx
+++ b/Session5/Session5_Slides.pptx
@@ -13111,7 +13111,7 @@
           </a:ln>
           <a:extLst>
             <a:ext uri="{C572A759-6A51-4108-AA02-DFA0A04FC94B}">
-              <ma14:wrappingTextBoxFlag xmlns:ma14="http://schemas.microsoft.com/office/mac/drawingml/2011/main" xmlns="" val="1"/>
+              <ma14:wrappingTextBoxFlag xmlns="" xmlns:ma14="http://schemas.microsoft.com/office/mac/drawingml/2011/main" val="1"/>
             </a:ext>
           </a:extLst>
         </p:spPr>
@@ -13150,7 +13150,7 @@
           </a:ln>
           <a:extLst>
             <a:ext uri="{C572A759-6A51-4108-AA02-DFA0A04FC94B}">
-              <ma14:wrappingTextBoxFlag xmlns:ma14="http://schemas.microsoft.com/office/mac/drawingml/2011/main" xmlns="" val="1"/>
+              <ma14:wrappingTextBoxFlag xmlns="" xmlns:ma14="http://schemas.microsoft.com/office/mac/drawingml/2011/main" val="1"/>
             </a:ext>
           </a:extLst>
         </p:spPr>
@@ -14210,7 +14210,7 @@
           </a:ln>
           <a:extLst>
             <a:ext uri="{C572A759-6A51-4108-AA02-DFA0A04FC94B}">
-              <ma14:wrappingTextBoxFlag xmlns:ma14="http://schemas.microsoft.com/office/mac/drawingml/2011/main" xmlns="" val="1"/>
+              <ma14:wrappingTextBoxFlag xmlns="" xmlns:ma14="http://schemas.microsoft.com/office/mac/drawingml/2011/main" val="1"/>
             </a:ext>
           </a:extLst>
         </p:spPr>
@@ -14321,7 +14321,7 @@
           </a:ln>
           <a:extLst>
             <a:ext uri="{C572A759-6A51-4108-AA02-DFA0A04FC94B}">
-              <ma14:wrappingTextBoxFlag xmlns:ma14="http://schemas.microsoft.com/office/mac/drawingml/2011/main" xmlns="" val="1"/>
+              <ma14:wrappingTextBoxFlag xmlns="" xmlns:ma14="http://schemas.microsoft.com/office/mac/drawingml/2011/main" val="1"/>
             </a:ext>
           </a:extLst>
         </p:spPr>
@@ -14453,7 +14453,7 @@
           </a:ln>
           <a:extLst>
             <a:ext uri="{C572A759-6A51-4108-AA02-DFA0A04FC94B}">
-              <ma14:wrappingTextBoxFlag xmlns:ma14="http://schemas.microsoft.com/office/mac/drawingml/2011/main" xmlns="" val="1"/>
+              <ma14:wrappingTextBoxFlag xmlns="" xmlns:ma14="http://schemas.microsoft.com/office/mac/drawingml/2011/main" val="1"/>
             </a:ext>
           </a:extLst>
         </p:spPr>
@@ -14610,7 +14610,7 @@
           </a:ln>
           <a:extLst>
             <a:ext uri="{C572A759-6A51-4108-AA02-DFA0A04FC94B}">
-              <ma14:wrappingTextBoxFlag xmlns="" xmlns:ma14="http://schemas.microsoft.com/office/mac/drawingml/2011/main" val="1"/>
+              <ma14:wrappingTextBoxFlag xmlns:ma14="http://schemas.microsoft.com/office/mac/drawingml/2011/main" xmlns="" val="1"/>
             </a:ext>
           </a:extLst>
         </p:spPr>
@@ -15002,7 +15002,7 @@
           </a:ln>
           <a:extLst>
             <a:ext uri="{C572A759-6A51-4108-AA02-DFA0A04FC94B}">
-              <ma14:wrappingTextBoxFlag xmlns:ma14="http://schemas.microsoft.com/office/mac/drawingml/2011/main" xmlns="" val="1"/>
+              <ma14:wrappingTextBoxFlag xmlns="" xmlns:ma14="http://schemas.microsoft.com/office/mac/drawingml/2011/main" val="1"/>
             </a:ext>
           </a:extLst>
         </p:spPr>
@@ -15066,7 +15066,7 @@
           </a:ln>
           <a:extLst>
             <a:ext uri="{C572A759-6A51-4108-AA02-DFA0A04FC94B}">
-              <ma14:wrappingTextBoxFlag xmlns:ma14="http://schemas.microsoft.com/office/mac/drawingml/2011/main" xmlns="" val="1"/>
+              <ma14:wrappingTextBoxFlag xmlns="" xmlns:ma14="http://schemas.microsoft.com/office/mac/drawingml/2011/main" val="1"/>
             </a:ext>
           </a:extLst>
         </p:spPr>
@@ -15133,7 +15133,7 @@
           </a:ln>
           <a:extLst>
             <a:ext uri="{C572A759-6A51-4108-AA02-DFA0A04FC94B}">
-              <ma14:wrappingTextBoxFlag xmlns="" xmlns:ma14="http://schemas.microsoft.com/office/mac/drawingml/2011/main" val="1"/>
+              <ma14:wrappingTextBoxFlag xmlns:ma14="http://schemas.microsoft.com/office/mac/drawingml/2011/main" xmlns="" val="1"/>
             </a:ext>
           </a:extLst>
         </p:spPr>
@@ -15186,7 +15186,7 @@
               </a:ln>
               <a:extLst>
                 <a:ext uri="{C572A759-6A51-4108-AA02-DFA0A04FC94B}">
-                  <ma14:wrappingTextBoxFlag xmlns="" xmlns:ma14="http://schemas.microsoft.com/office/mac/drawingml/2011/main" val="1"/>
+                  <ma14:wrappingTextBoxFlag xmlns:ma14="http://schemas.microsoft.com/office/mac/drawingml/2011/main" xmlns="" val="1"/>
                 </a:ext>
               </a:extLst>
             </p:spPr>
@@ -15263,7 +15263,7 @@
                               </a:solidFill>
                               <a:latin typeface="Cambria Math" panose="02040503050406030204" pitchFamily="18" charset="0"/>
                             </a:rPr>
-                            <m:t>𝐵</m:t>
+                            <m:t>𝐷</m:t>
                           </m:r>
                           <m:r>
                             <a:rPr lang="en-US" b="0" i="1" smtClean="0">
@@ -15301,7 +15301,7 @@
                               </a:solidFill>
                               <a:latin typeface="Cambria Math" panose="02040503050406030204" pitchFamily="18" charset="0"/>
                             </a:rPr>
-                            <m:t>𝐵</m:t>
+                            <m:t>𝐷</m:t>
                           </m:r>
                           <m:r>
                             <a:rPr lang="en-US" b="0" i="1" smtClean="0">
@@ -15348,7 +15348,7 @@
               <a:blipFill>
                 <a:blip r:embed="rId3"/>
                 <a:stretch>
-                  <a:fillRect l="-4620" t="-472" r="-7921" b="-15094"/>
+                  <a:fillRect l="-4950" t="-472" r="-8251" b="-15094"/>
                 </a:stretch>
               </a:blipFill>
               <a:ln w="12700">
@@ -15356,7 +15356,7 @@
               </a:ln>
               <a:extLst>
                 <a:ext uri="{C572A759-6A51-4108-AA02-DFA0A04FC94B}">
-                  <ma14:wrappingTextBoxFlag xmlns="" xmlns:ma14="http://schemas.microsoft.com/office/mac/drawingml/2011/main" xmlns:a14="http://schemas.microsoft.com/office/drawing/2010/main" val="1"/>
+                  <ma14:wrappingTextBoxFlag xmlns:ma14="http://schemas.microsoft.com/office/mac/drawingml/2011/main" xmlns="" xmlns:a14="http://schemas.microsoft.com/office/drawing/2010/main" val="1"/>
                 </a:ext>
               </a:extLst>
             </p:spPr>
@@ -15815,7 +15815,7 @@
           </a:ln>
           <a:extLst>
             <a:ext uri="{C572A759-6A51-4108-AA02-DFA0A04FC94B}">
-              <ma14:wrappingTextBoxFlag xmlns="" xmlns:ma14="http://schemas.microsoft.com/office/mac/drawingml/2011/main" val="1"/>
+              <ma14:wrappingTextBoxFlag xmlns:ma14="http://schemas.microsoft.com/office/mac/drawingml/2011/main" xmlns="" val="1"/>
             </a:ext>
           </a:extLst>
         </p:spPr>
@@ -15882,7 +15882,7 @@
           </a:ln>
           <a:extLst>
             <a:ext uri="{C572A759-6A51-4108-AA02-DFA0A04FC94B}">
-              <ma14:wrappingTextBoxFlag xmlns="" xmlns:ma14="http://schemas.microsoft.com/office/mac/drawingml/2011/main" val="1"/>
+              <ma14:wrappingTextBoxFlag xmlns:ma14="http://schemas.microsoft.com/office/mac/drawingml/2011/main" xmlns="" val="1"/>
             </a:ext>
           </a:extLst>
         </p:spPr>
@@ -15950,7 +15950,7 @@
           </a:ln>
           <a:extLst>
             <a:ext uri="{C572A759-6A51-4108-AA02-DFA0A04FC94B}">
-              <ma14:wrappingTextBoxFlag xmlns:ma14="http://schemas.microsoft.com/office/mac/drawingml/2011/main" xmlns="" val="1"/>
+              <ma14:wrappingTextBoxFlag xmlns="" xmlns:ma14="http://schemas.microsoft.com/office/mac/drawingml/2011/main" val="1"/>
             </a:ext>
           </a:extLst>
         </p:spPr>
@@ -15975,8 +15975,8 @@
           </a:p>
         </p:txBody>
       </p:sp>
-      <mc:AlternateContent xmlns:mc="http://schemas.openxmlformats.org/markup-compatibility/2006">
-        <mc:Choice xmlns:a14="http://schemas.microsoft.com/office/drawing/2010/main" Requires="a14">
+      <mc:AlternateContent xmlns:mc="http://schemas.openxmlformats.org/markup-compatibility/2006" xmlns:a14="http://schemas.microsoft.com/office/drawing/2010/main">
+        <mc:Choice Requires="a14">
           <p:sp>
             <p:nvSpPr>
               <p:cNvPr id="13" name="Shape 237">
@@ -16003,7 +16003,7 @@
               </a:ln>
               <a:extLst>
                 <a:ext uri="{C572A759-6A51-4108-AA02-DFA0A04FC94B}">
-                  <ma14:wrappingTextBoxFlag xmlns:ma14="http://schemas.microsoft.com/office/mac/drawingml/2011/main" xmlns="" val="1"/>
+                  <ma14:wrappingTextBoxFlag xmlns="" xmlns:ma14="http://schemas.microsoft.com/office/mac/drawingml/2011/main" val="1"/>
                 </a:ext>
               </a:extLst>
             </p:spPr>
@@ -16139,7 +16139,7 @@
             </p:txBody>
           </p:sp>
         </mc:Choice>
-        <mc:Fallback>
+        <mc:Fallback xmlns="">
           <p:sp>
             <p:nvSpPr>
               <p:cNvPr id="13" name="Shape 237">
@@ -16385,8 +16385,8 @@
           <a:chExt cx="0" cy="0"/>
         </a:xfrm>
       </p:grpSpPr>
-      <mc:AlternateContent xmlns:mc="http://schemas.openxmlformats.org/markup-compatibility/2006">
-        <mc:Choice xmlns:a14="http://schemas.microsoft.com/office/drawing/2010/main" Requires="a14">
+      <mc:AlternateContent xmlns:mc="http://schemas.openxmlformats.org/markup-compatibility/2006" xmlns:a14="http://schemas.microsoft.com/office/drawing/2010/main">
+        <mc:Choice Requires="a14">
           <p:sp>
             <p:nvSpPr>
               <p:cNvPr id="13" name="TextBox 12">
@@ -16736,7 +16736,7 @@
             </p:txBody>
           </p:sp>
         </mc:Choice>
-        <mc:Fallback>
+        <mc:Fallback xmlns="">
           <p:sp>
             <p:nvSpPr>
               <p:cNvPr id="13" name="TextBox 12">
@@ -16808,7 +16808,7 @@
           </a:ln>
           <a:extLst>
             <a:ext uri="{C572A759-6A51-4108-AA02-DFA0A04FC94B}">
-              <ma14:wrappingTextBoxFlag xmlns:ma14="http://schemas.microsoft.com/office/mac/drawingml/2011/main" xmlns="" val="1"/>
+              <ma14:wrappingTextBoxFlag xmlns="" xmlns:ma14="http://schemas.microsoft.com/office/mac/drawingml/2011/main" val="1"/>
             </a:ext>
           </a:extLst>
         </p:spPr>
@@ -17034,7 +17034,7 @@
           </a:ln>
           <a:extLst>
             <a:ext uri="{C572A759-6A51-4108-AA02-DFA0A04FC94B}">
-              <ma14:wrappingTextBoxFlag xmlns="" xmlns:ma14="http://schemas.microsoft.com/office/mac/drawingml/2011/main" val="1"/>
+              <ma14:wrappingTextBoxFlag xmlns:ma14="http://schemas.microsoft.com/office/mac/drawingml/2011/main" xmlns="" val="1"/>
             </a:ext>
           </a:extLst>
         </p:spPr>
@@ -17558,7 +17558,7 @@
           </a:ln>
           <a:extLst>
             <a:ext uri="{C572A759-6A51-4108-AA02-DFA0A04FC94B}">
-              <ma14:wrappingTextBoxFlag xmlns:ma14="http://schemas.microsoft.com/office/mac/drawingml/2011/main" xmlns="" val="1"/>
+              <ma14:wrappingTextBoxFlag xmlns="" xmlns:ma14="http://schemas.microsoft.com/office/mac/drawingml/2011/main" val="1"/>
             </a:ext>
           </a:extLst>
         </p:spPr>
@@ -18305,7 +18305,7 @@
           </a:ln>
           <a:extLst>
             <a:ext uri="{C572A759-6A51-4108-AA02-DFA0A04FC94B}">
-              <ma14:wrappingTextBoxFlag xmlns:ma14="http://schemas.microsoft.com/office/mac/drawingml/2011/main" xmlns="" val="1"/>
+              <ma14:wrappingTextBoxFlag xmlns="" xmlns:ma14="http://schemas.microsoft.com/office/mac/drawingml/2011/main" val="1"/>
             </a:ext>
           </a:extLst>
         </p:spPr>
@@ -18450,7 +18450,7 @@
           </a:ln>
           <a:extLst>
             <a:ext uri="{C572A759-6A51-4108-AA02-DFA0A04FC94B}">
-              <ma14:wrappingTextBoxFlag xmlns:ma14="http://schemas.microsoft.com/office/mac/drawingml/2011/main" xmlns="" val="1"/>
+              <ma14:wrappingTextBoxFlag xmlns="" xmlns:ma14="http://schemas.microsoft.com/office/mac/drawingml/2011/main" val="1"/>
             </a:ext>
           </a:extLst>
         </p:spPr>
@@ -18667,7 +18667,7 @@
           </a:ln>
           <a:extLst>
             <a:ext uri="{C572A759-6A51-4108-AA02-DFA0A04FC94B}">
-              <ma14:wrappingTextBoxFlag xmlns:ma14="http://schemas.microsoft.com/office/mac/drawingml/2011/main" xmlns="" val="1"/>
+              <ma14:wrappingTextBoxFlag xmlns="" xmlns:ma14="http://schemas.microsoft.com/office/mac/drawingml/2011/main" val="1"/>
             </a:ext>
           </a:extLst>
         </p:spPr>
@@ -19396,7 +19396,7 @@
           </a:ln>
           <a:extLst>
             <a:ext uri="{C572A759-6A51-4108-AA02-DFA0A04FC94B}">
-              <ma14:wrappingTextBoxFlag xmlns:ma14="http://schemas.microsoft.com/office/mac/drawingml/2011/main" xmlns="" val="1"/>
+              <ma14:wrappingTextBoxFlag xmlns="" xmlns:ma14="http://schemas.microsoft.com/office/mac/drawingml/2011/main" val="1"/>
             </a:ext>
           </a:extLst>
         </p:spPr>
@@ -19572,7 +19572,7 @@
           </a:ln>
           <a:extLst>
             <a:ext uri="{C572A759-6A51-4108-AA02-DFA0A04FC94B}">
-              <ma14:wrappingTextBoxFlag xmlns:ma14="http://schemas.microsoft.com/office/mac/drawingml/2011/main" xmlns="" val="1"/>
+              <ma14:wrappingTextBoxFlag xmlns="" xmlns:ma14="http://schemas.microsoft.com/office/mac/drawingml/2011/main" val="1"/>
             </a:ext>
           </a:extLst>
         </p:spPr>

</xml_diff>